<commit_message>
non-working LSTM for the reference.
</commit_message>
<xml_diff>
--- a/Conceptualise.pptx
+++ b/Conceptualise.pptx
@@ -261,7 +261,7 @@
           <a:p>
             <a:fld id="{9A28510E-00F5-4137-A9AE-8D81C455C0FD}" type="datetimeFigureOut">
               <a:rPr lang="en-US" smtClean="0"/>
-              <a:t>5/30/24</a:t>
+              <a:t>6/3/24</a:t>
             </a:fld>
             <a:endParaRPr lang="en-US"/>
           </a:p>
@@ -459,7 +459,7 @@
           <a:p>
             <a:fld id="{9A28510E-00F5-4137-A9AE-8D81C455C0FD}" type="datetimeFigureOut">
               <a:rPr lang="en-US" smtClean="0"/>
-              <a:t>5/30/24</a:t>
+              <a:t>6/3/24</a:t>
             </a:fld>
             <a:endParaRPr lang="en-US"/>
           </a:p>
@@ -667,7 +667,7 @@
           <a:p>
             <a:fld id="{9A28510E-00F5-4137-A9AE-8D81C455C0FD}" type="datetimeFigureOut">
               <a:rPr lang="en-US" smtClean="0"/>
-              <a:t>5/30/24</a:t>
+              <a:t>6/3/24</a:t>
             </a:fld>
             <a:endParaRPr lang="en-US"/>
           </a:p>
@@ -865,7 +865,7 @@
           <a:p>
             <a:fld id="{9A28510E-00F5-4137-A9AE-8D81C455C0FD}" type="datetimeFigureOut">
               <a:rPr lang="en-US" smtClean="0"/>
-              <a:t>5/30/24</a:t>
+              <a:t>6/3/24</a:t>
             </a:fld>
             <a:endParaRPr lang="en-US"/>
           </a:p>
@@ -1140,7 +1140,7 @@
           <a:p>
             <a:fld id="{9A28510E-00F5-4137-A9AE-8D81C455C0FD}" type="datetimeFigureOut">
               <a:rPr lang="en-US" smtClean="0"/>
-              <a:t>5/30/24</a:t>
+              <a:t>6/3/24</a:t>
             </a:fld>
             <a:endParaRPr lang="en-US"/>
           </a:p>
@@ -1405,7 +1405,7 @@
           <a:p>
             <a:fld id="{9A28510E-00F5-4137-A9AE-8D81C455C0FD}" type="datetimeFigureOut">
               <a:rPr lang="en-US" smtClean="0"/>
-              <a:t>5/30/24</a:t>
+              <a:t>6/3/24</a:t>
             </a:fld>
             <a:endParaRPr lang="en-US"/>
           </a:p>
@@ -1817,7 +1817,7 @@
           <a:p>
             <a:fld id="{9A28510E-00F5-4137-A9AE-8D81C455C0FD}" type="datetimeFigureOut">
               <a:rPr lang="en-US" smtClean="0"/>
-              <a:t>5/30/24</a:t>
+              <a:t>6/3/24</a:t>
             </a:fld>
             <a:endParaRPr lang="en-US"/>
           </a:p>
@@ -1958,7 +1958,7 @@
           <a:p>
             <a:fld id="{9A28510E-00F5-4137-A9AE-8D81C455C0FD}" type="datetimeFigureOut">
               <a:rPr lang="en-US" smtClean="0"/>
-              <a:t>5/30/24</a:t>
+              <a:t>6/3/24</a:t>
             </a:fld>
             <a:endParaRPr lang="en-US"/>
           </a:p>
@@ -2071,7 +2071,7 @@
           <a:p>
             <a:fld id="{9A28510E-00F5-4137-A9AE-8D81C455C0FD}" type="datetimeFigureOut">
               <a:rPr lang="en-US" smtClean="0"/>
-              <a:t>5/30/24</a:t>
+              <a:t>6/3/24</a:t>
             </a:fld>
             <a:endParaRPr lang="en-US"/>
           </a:p>
@@ -2382,7 +2382,7 @@
           <a:p>
             <a:fld id="{9A28510E-00F5-4137-A9AE-8D81C455C0FD}" type="datetimeFigureOut">
               <a:rPr lang="en-US" smtClean="0"/>
-              <a:t>5/30/24</a:t>
+              <a:t>6/3/24</a:t>
             </a:fld>
             <a:endParaRPr lang="en-US"/>
           </a:p>
@@ -2670,7 +2670,7 @@
           <a:p>
             <a:fld id="{9A28510E-00F5-4137-A9AE-8D81C455C0FD}" type="datetimeFigureOut">
               <a:rPr lang="en-US" smtClean="0"/>
-              <a:t>5/30/24</a:t>
+              <a:t>6/3/24</a:t>
             </a:fld>
             <a:endParaRPr lang="en-US"/>
           </a:p>
@@ -2911,7 +2911,7 @@
           <a:p>
             <a:fld id="{9A28510E-00F5-4137-A9AE-8D81C455C0FD}" type="datetimeFigureOut">
               <a:rPr lang="en-US" smtClean="0"/>
-              <a:t>5/30/24</a:t>
+              <a:t>6/3/24</a:t>
             </a:fld>
             <a:endParaRPr lang="en-US"/>
           </a:p>
@@ -5686,7 +5686,7 @@
         </p:nvSpPr>
         <p:spPr>
           <a:xfrm>
-            <a:off x="0" y="0"/>
+            <a:off x="11289" y="0"/>
             <a:ext cx="12192000" cy="6858000"/>
           </a:xfrm>
           <a:prstGeom prst="rect">
@@ -22857,6 +22857,126 @@
           </a:fontRef>
         </p:style>
       </p:cxnSp>
+      <p:sp>
+        <p:nvSpPr>
+          <p:cNvPr id="255" name="Rectangle 254">
+            <a:extLst>
+              <a:ext uri="{FF2B5EF4-FFF2-40B4-BE49-F238E27FC236}">
+                <a16:creationId xmlns:a16="http://schemas.microsoft.com/office/drawing/2014/main" id="{2DF31C79-7F6B-B841-A7C7-ED9F7887053C}"/>
+              </a:ext>
+            </a:extLst>
+          </p:cNvPr>
+          <p:cNvSpPr/>
+          <p:nvPr/>
+        </p:nvSpPr>
+        <p:spPr>
+          <a:xfrm>
+            <a:off x="7442568" y="677268"/>
+            <a:ext cx="1384750" cy="460449"/>
+          </a:xfrm>
+          <a:prstGeom prst="rect">
+            <a:avLst/>
+          </a:prstGeom>
+          <a:noFill/>
+          <a:ln w="3175">
+            <a:noFill/>
+          </a:ln>
+        </p:spPr>
+        <p:style>
+          <a:lnRef idx="2">
+            <a:schemeClr val="accent1">
+              <a:shade val="15000"/>
+            </a:schemeClr>
+          </a:lnRef>
+          <a:fillRef idx="1">
+            <a:schemeClr val="accent1"/>
+          </a:fillRef>
+          <a:effectRef idx="0">
+            <a:schemeClr val="accent1"/>
+          </a:effectRef>
+          <a:fontRef idx="minor">
+            <a:schemeClr val="lt1"/>
+          </a:fontRef>
+        </p:style>
+        <p:txBody>
+          <a:bodyPr rtlCol="0" anchor="ctr"/>
+          <a:lstStyle/>
+          <a:p>
+            <a:pPr algn="ctr"/>
+            <a:r>
+              <a:rPr lang="en-US" sz="1800" b="1" dirty="0">
+                <a:solidFill>
+                  <a:schemeClr val="tx1"/>
+                </a:solidFill>
+                <a:latin typeface="Calibri" panose="020F0502020204030204" pitchFamily="34" charset="0"/>
+                <a:ea typeface="Calibri" panose="020F0502020204030204" pitchFamily="34" charset="0"/>
+                <a:cs typeface="Calibri" panose="020F0502020204030204" pitchFamily="34" charset="0"/>
+              </a:rPr>
+              <a:t>5308 games</a:t>
+            </a:r>
+          </a:p>
+        </p:txBody>
+      </p:sp>
+      <p:sp>
+        <p:nvSpPr>
+          <p:cNvPr id="279" name="Rectangle 278">
+            <a:extLst>
+              <a:ext uri="{FF2B5EF4-FFF2-40B4-BE49-F238E27FC236}">
+                <a16:creationId xmlns:a16="http://schemas.microsoft.com/office/drawing/2014/main" id="{2CBA2841-384A-7444-9BC9-18E02A77F639}"/>
+              </a:ext>
+            </a:extLst>
+          </p:cNvPr>
+          <p:cNvSpPr/>
+          <p:nvPr/>
+        </p:nvSpPr>
+        <p:spPr>
+          <a:xfrm>
+            <a:off x="622889" y="5427328"/>
+            <a:ext cx="3642207" cy="460449"/>
+          </a:xfrm>
+          <a:prstGeom prst="rect">
+            <a:avLst/>
+          </a:prstGeom>
+          <a:noFill/>
+          <a:ln w="3175">
+            <a:noFill/>
+          </a:ln>
+        </p:spPr>
+        <p:style>
+          <a:lnRef idx="2">
+            <a:schemeClr val="accent1">
+              <a:shade val="15000"/>
+            </a:schemeClr>
+          </a:lnRef>
+          <a:fillRef idx="1">
+            <a:schemeClr val="accent1"/>
+          </a:fillRef>
+          <a:effectRef idx="0">
+            <a:schemeClr val="accent1"/>
+          </a:effectRef>
+          <a:fontRef idx="minor">
+            <a:schemeClr val="lt1"/>
+          </a:fontRef>
+        </p:style>
+        <p:txBody>
+          <a:bodyPr rtlCol="0" anchor="ctr"/>
+          <a:lstStyle/>
+          <a:p>
+            <a:pPr algn="ctr"/>
+            <a:r>
+              <a:rPr lang="en-US" sz="1800" b="1" dirty="0">
+                <a:solidFill>
+                  <a:schemeClr val="tx1"/>
+                </a:solidFill>
+                <a:latin typeface="Calibri" panose="020F0502020204030204" pitchFamily="34" charset="0"/>
+                <a:ea typeface="Calibri" panose="020F0502020204030204" pitchFamily="34" charset="0"/>
+                <a:cs typeface="Calibri" panose="020F0502020204030204" pitchFamily="34" charset="0"/>
+              </a:rPr>
+              <a:t>The number of plays : 91 – 225</a:t>
+            </a:r>
+          </a:p>
+        </p:txBody>
+      </p:sp>
     </p:spTree>
     <p:extLst>
       <p:ext uri="{BB962C8B-B14F-4D97-AF65-F5344CB8AC3E}">

</xml_diff>